<commit_message>
add change of overview file
</commit_message>
<xml_diff>
--- a/DOCUMENTs/Module Ban Hang/Overview.Shopping.Module.v.0.0.2.pptx
+++ b/DOCUMENTs/Module Ban Hang/Overview.Shopping.Module.v.0.0.2.pptx
@@ -13,6 +13,7 @@
     <p:sldId id="260" r:id="rId8"/>
     <p:sldId id="261" r:id="rId9"/>
     <p:sldId id="262" r:id="rId10"/>
+    <p:sldId id="263" r:id="rId11"/>
   </p:sldIdLst>
   <p:sldSz cx="10080625" cy="7559675"/>
   <p:notesSz cx="7772400" cy="10058400"/>
@@ -71,7 +72,7 @@
         <p:spPr>
           <a:xfrm>
             <a:off x="504000" y="301320"/>
-            <a:ext cx="9071280" cy="1262520"/>
+            <a:ext cx="9072000" cy="1262160"/>
           </a:xfrm>
           <a:prstGeom prst="rect">
             <a:avLst/>
@@ -97,8 +98,8 @@
         </p:nvSpPr>
         <p:spPr>
           <a:xfrm>
-            <a:off x="504000" y="1769040"/>
-            <a:ext cx="9071280" cy="2090520"/>
+            <a:off x="504000" y="1768680"/>
+            <a:ext cx="9072000" cy="2090880"/>
           </a:xfrm>
           <a:prstGeom prst="rect">
             <a:avLst/>
@@ -124,7 +125,7 @@
         <p:spPr>
           <a:xfrm>
             <a:off x="504000" y="4058280"/>
-            <a:ext cx="9071280" cy="2090520"/>
+            <a:ext cx="9072000" cy="2090880"/>
           </a:xfrm>
           <a:prstGeom prst="rect">
             <a:avLst/>
@@ -172,7 +173,7 @@
         <p:spPr>
           <a:xfrm>
             <a:off x="504000" y="301320"/>
-            <a:ext cx="9071280" cy="1262520"/>
+            <a:ext cx="9072000" cy="1262160"/>
           </a:xfrm>
           <a:prstGeom prst="rect">
             <a:avLst/>
@@ -198,8 +199,8 @@
         </p:nvSpPr>
         <p:spPr>
           <a:xfrm>
-            <a:off x="504000" y="1769040"/>
-            <a:ext cx="4426560" cy="2090520"/>
+            <a:off x="504000" y="1768680"/>
+            <a:ext cx="4426920" cy="2090880"/>
           </a:xfrm>
           <a:prstGeom prst="rect">
             <a:avLst/>
@@ -224,8 +225,8 @@
         </p:nvSpPr>
         <p:spPr>
           <a:xfrm>
-            <a:off x="5151960" y="1769040"/>
-            <a:ext cx="4426560" cy="2090520"/>
+            <a:off x="5152320" y="1768680"/>
+            <a:ext cx="4426920" cy="2090880"/>
           </a:xfrm>
           <a:prstGeom prst="rect">
             <a:avLst/>
@@ -250,8 +251,8 @@
         </p:nvSpPr>
         <p:spPr>
           <a:xfrm>
-            <a:off x="5151960" y="4058280"/>
-            <a:ext cx="4426560" cy="2090520"/>
+            <a:off x="5152320" y="4058280"/>
+            <a:ext cx="4426920" cy="2090880"/>
           </a:xfrm>
           <a:prstGeom prst="rect">
             <a:avLst/>
@@ -277,7 +278,7 @@
         <p:spPr>
           <a:xfrm>
             <a:off x="504000" y="4058280"/>
-            <a:ext cx="4426560" cy="2090520"/>
+            <a:ext cx="4426920" cy="2090880"/>
           </a:xfrm>
           <a:prstGeom prst="rect">
             <a:avLst/>
@@ -325,7 +326,7 @@
         <p:spPr>
           <a:xfrm>
             <a:off x="504000" y="301320"/>
-            <a:ext cx="9071280" cy="1262520"/>
+            <a:ext cx="9072000" cy="1262160"/>
           </a:xfrm>
           <a:prstGeom prst="rect">
             <a:avLst/>
@@ -351,8 +352,8 @@
         </p:nvSpPr>
         <p:spPr>
           <a:xfrm>
-            <a:off x="504000" y="1769040"/>
-            <a:ext cx="4426560" cy="2090520"/>
+            <a:off x="504000" y="1768680"/>
+            <a:ext cx="4426920" cy="2090880"/>
           </a:xfrm>
           <a:prstGeom prst="rect">
             <a:avLst/>
@@ -377,8 +378,8 @@
         </p:nvSpPr>
         <p:spPr>
           <a:xfrm>
-            <a:off x="5151960" y="1769040"/>
-            <a:ext cx="4426560" cy="2090520"/>
+            <a:off x="5152320" y="1768680"/>
+            <a:ext cx="4426920" cy="2090880"/>
           </a:xfrm>
           <a:prstGeom prst="rect">
             <a:avLst/>
@@ -448,7 +449,7 @@
         <p:spPr>
           <a:xfrm>
             <a:off x="504000" y="301320"/>
-            <a:ext cx="9071280" cy="1262520"/>
+            <a:ext cx="9072000" cy="1262160"/>
           </a:xfrm>
           <a:prstGeom prst="rect">
             <a:avLst/>
@@ -474,8 +475,8 @@
         </p:nvSpPr>
         <p:spPr>
           <a:xfrm>
-            <a:off x="504000" y="1769040"/>
-            <a:ext cx="9071280" cy="4384080"/>
+            <a:off x="504000" y="1768680"/>
+            <a:ext cx="9072000" cy="4384440"/>
           </a:xfrm>
           <a:prstGeom prst="rect">
             <a:avLst/>
@@ -524,7 +525,7 @@
         <p:spPr>
           <a:xfrm>
             <a:off x="504000" y="301320"/>
-            <a:ext cx="9071280" cy="1262520"/>
+            <a:ext cx="9072000" cy="1262160"/>
           </a:xfrm>
           <a:prstGeom prst="rect">
             <a:avLst/>
@@ -550,8 +551,8 @@
         </p:nvSpPr>
         <p:spPr>
           <a:xfrm>
-            <a:off x="504000" y="1769040"/>
-            <a:ext cx="9071280" cy="4383720"/>
+            <a:off x="504000" y="1768680"/>
+            <a:ext cx="9072000" cy="4384080"/>
           </a:xfrm>
           <a:prstGeom prst="rect">
             <a:avLst/>
@@ -599,7 +600,7 @@
         <p:spPr>
           <a:xfrm>
             <a:off x="504000" y="301320"/>
-            <a:ext cx="9071280" cy="1262520"/>
+            <a:ext cx="9072000" cy="1262160"/>
           </a:xfrm>
           <a:prstGeom prst="rect">
             <a:avLst/>
@@ -625,8 +626,8 @@
         </p:nvSpPr>
         <p:spPr>
           <a:xfrm>
-            <a:off x="504000" y="1769040"/>
-            <a:ext cx="4426560" cy="4383720"/>
+            <a:off x="504000" y="1768680"/>
+            <a:ext cx="4426920" cy="4384080"/>
           </a:xfrm>
           <a:prstGeom prst="rect">
             <a:avLst/>
@@ -651,8 +652,8 @@
         </p:nvSpPr>
         <p:spPr>
           <a:xfrm>
-            <a:off x="5151960" y="1769040"/>
-            <a:ext cx="4426560" cy="4383720"/>
+            <a:off x="5152320" y="1768680"/>
+            <a:ext cx="4426920" cy="4384080"/>
           </a:xfrm>
           <a:prstGeom prst="rect">
             <a:avLst/>
@@ -700,7 +701,7 @@
         <p:spPr>
           <a:xfrm>
             <a:off x="504000" y="301320"/>
-            <a:ext cx="9071280" cy="1262520"/>
+            <a:ext cx="9072000" cy="1262160"/>
           </a:xfrm>
           <a:prstGeom prst="rect">
             <a:avLst/>
@@ -749,7 +750,7 @@
         <p:spPr>
           <a:xfrm>
             <a:off x="504000" y="301320"/>
-            <a:ext cx="9071280" cy="5851440"/>
+            <a:ext cx="9072000" cy="5851440"/>
           </a:xfrm>
           <a:prstGeom prst="rect">
             <a:avLst/>
@@ -798,7 +799,7 @@
         <p:spPr>
           <a:xfrm>
             <a:off x="504000" y="301320"/>
-            <a:ext cx="9071280" cy="1262520"/>
+            <a:ext cx="9072000" cy="1262160"/>
           </a:xfrm>
           <a:prstGeom prst="rect">
             <a:avLst/>
@@ -824,8 +825,8 @@
         </p:nvSpPr>
         <p:spPr>
           <a:xfrm>
-            <a:off x="504000" y="1769040"/>
-            <a:ext cx="4426560" cy="2090520"/>
+            <a:off x="504000" y="1768680"/>
+            <a:ext cx="4426920" cy="2090880"/>
           </a:xfrm>
           <a:prstGeom prst="rect">
             <a:avLst/>
@@ -851,7 +852,7 @@
         <p:spPr>
           <a:xfrm>
             <a:off x="504000" y="4058280"/>
-            <a:ext cx="4426560" cy="2090520"/>
+            <a:ext cx="4426920" cy="2090880"/>
           </a:xfrm>
           <a:prstGeom prst="rect">
             <a:avLst/>
@@ -876,8 +877,8 @@
         </p:nvSpPr>
         <p:spPr>
           <a:xfrm>
-            <a:off x="5151960" y="1769040"/>
-            <a:ext cx="4426560" cy="4383720"/>
+            <a:off x="5152320" y="1768680"/>
+            <a:ext cx="4426920" cy="4384080"/>
           </a:xfrm>
           <a:prstGeom prst="rect">
             <a:avLst/>
@@ -925,7 +926,7 @@
         <p:spPr>
           <a:xfrm>
             <a:off x="504000" y="301320"/>
-            <a:ext cx="9071280" cy="1262520"/>
+            <a:ext cx="9072000" cy="1262160"/>
           </a:xfrm>
           <a:prstGeom prst="rect">
             <a:avLst/>
@@ -951,8 +952,8 @@
         </p:nvSpPr>
         <p:spPr>
           <a:xfrm>
-            <a:off x="504000" y="1769040"/>
-            <a:ext cx="9071280" cy="4384080"/>
+            <a:off x="504000" y="1768680"/>
+            <a:ext cx="9072000" cy="4384440"/>
           </a:xfrm>
           <a:prstGeom prst="rect">
             <a:avLst/>
@@ -1001,7 +1002,7 @@
         <p:spPr>
           <a:xfrm>
             <a:off x="504000" y="301320"/>
-            <a:ext cx="9071280" cy="1262520"/>
+            <a:ext cx="9072000" cy="1262160"/>
           </a:xfrm>
           <a:prstGeom prst="rect">
             <a:avLst/>
@@ -1027,8 +1028,8 @@
         </p:nvSpPr>
         <p:spPr>
           <a:xfrm>
-            <a:off x="504000" y="1769040"/>
-            <a:ext cx="4426560" cy="4383720"/>
+            <a:off x="504000" y="1768680"/>
+            <a:ext cx="4426920" cy="4384080"/>
           </a:xfrm>
           <a:prstGeom prst="rect">
             <a:avLst/>
@@ -1053,8 +1054,8 @@
         </p:nvSpPr>
         <p:spPr>
           <a:xfrm>
-            <a:off x="5151960" y="1769040"/>
-            <a:ext cx="4426560" cy="2090520"/>
+            <a:off x="5152320" y="1768680"/>
+            <a:ext cx="4426920" cy="2090880"/>
           </a:xfrm>
           <a:prstGeom prst="rect">
             <a:avLst/>
@@ -1079,8 +1080,8 @@
         </p:nvSpPr>
         <p:spPr>
           <a:xfrm>
-            <a:off x="5151960" y="4058280"/>
-            <a:ext cx="4426560" cy="2090520"/>
+            <a:off x="5152320" y="4058280"/>
+            <a:ext cx="4426920" cy="2090880"/>
           </a:xfrm>
           <a:prstGeom prst="rect">
             <a:avLst/>
@@ -1128,7 +1129,7 @@
         <p:spPr>
           <a:xfrm>
             <a:off x="504000" y="301320"/>
-            <a:ext cx="9071280" cy="1262520"/>
+            <a:ext cx="9072000" cy="1262160"/>
           </a:xfrm>
           <a:prstGeom prst="rect">
             <a:avLst/>
@@ -1154,8 +1155,8 @@
         </p:nvSpPr>
         <p:spPr>
           <a:xfrm>
-            <a:off x="504000" y="1769040"/>
-            <a:ext cx="4426560" cy="2090520"/>
+            <a:off x="504000" y="1768680"/>
+            <a:ext cx="4426920" cy="2090880"/>
           </a:xfrm>
           <a:prstGeom prst="rect">
             <a:avLst/>
@@ -1180,8 +1181,8 @@
         </p:nvSpPr>
         <p:spPr>
           <a:xfrm>
-            <a:off x="5151960" y="1769040"/>
-            <a:ext cx="4426560" cy="2090520"/>
+            <a:off x="5152320" y="1768680"/>
+            <a:ext cx="4426920" cy="2090880"/>
           </a:xfrm>
           <a:prstGeom prst="rect">
             <a:avLst/>
@@ -1207,7 +1208,7 @@
         <p:spPr>
           <a:xfrm>
             <a:off x="504000" y="4058280"/>
-            <a:ext cx="9070920" cy="2090520"/>
+            <a:ext cx="9071640" cy="2090880"/>
           </a:xfrm>
           <a:prstGeom prst="rect">
             <a:avLst/>
@@ -1255,7 +1256,7 @@
         <p:spPr>
           <a:xfrm>
             <a:off x="504000" y="301320"/>
-            <a:ext cx="9071280" cy="1262520"/>
+            <a:ext cx="9072000" cy="1262160"/>
           </a:xfrm>
           <a:prstGeom prst="rect">
             <a:avLst/>
@@ -1281,8 +1282,8 @@
         </p:nvSpPr>
         <p:spPr>
           <a:xfrm>
-            <a:off x="504000" y="1769040"/>
-            <a:ext cx="9071280" cy="2090520"/>
+            <a:off x="504000" y="1768680"/>
+            <a:ext cx="9072000" cy="2090880"/>
           </a:xfrm>
           <a:prstGeom prst="rect">
             <a:avLst/>
@@ -1308,7 +1309,7 @@
         <p:spPr>
           <a:xfrm>
             <a:off x="504000" y="4058280"/>
-            <a:ext cx="9071280" cy="2090520"/>
+            <a:ext cx="9072000" cy="2090880"/>
           </a:xfrm>
           <a:prstGeom prst="rect">
             <a:avLst/>
@@ -1356,7 +1357,7 @@
         <p:spPr>
           <a:xfrm>
             <a:off x="504000" y="301320"/>
-            <a:ext cx="9071280" cy="1262520"/>
+            <a:ext cx="9072000" cy="1262160"/>
           </a:xfrm>
           <a:prstGeom prst="rect">
             <a:avLst/>
@@ -1382,8 +1383,8 @@
         </p:nvSpPr>
         <p:spPr>
           <a:xfrm>
-            <a:off x="504000" y="1769040"/>
-            <a:ext cx="4426560" cy="2090520"/>
+            <a:off x="504000" y="1768680"/>
+            <a:ext cx="4426920" cy="2090880"/>
           </a:xfrm>
           <a:prstGeom prst="rect">
             <a:avLst/>
@@ -1408,8 +1409,8 @@
         </p:nvSpPr>
         <p:spPr>
           <a:xfrm>
-            <a:off x="5151960" y="1769040"/>
-            <a:ext cx="4426560" cy="2090520"/>
+            <a:off x="5152320" y="1768680"/>
+            <a:ext cx="4426920" cy="2090880"/>
           </a:xfrm>
           <a:prstGeom prst="rect">
             <a:avLst/>
@@ -1434,8 +1435,8 @@
         </p:nvSpPr>
         <p:spPr>
           <a:xfrm>
-            <a:off x="5151960" y="4058280"/>
-            <a:ext cx="4426560" cy="2090520"/>
+            <a:off x="5152320" y="4058280"/>
+            <a:ext cx="4426920" cy="2090880"/>
           </a:xfrm>
           <a:prstGeom prst="rect">
             <a:avLst/>
@@ -1461,7 +1462,7 @@
         <p:spPr>
           <a:xfrm>
             <a:off x="504000" y="4058280"/>
-            <a:ext cx="4426560" cy="2090520"/>
+            <a:ext cx="4426920" cy="2090880"/>
           </a:xfrm>
           <a:prstGeom prst="rect">
             <a:avLst/>
@@ -1509,7 +1510,7 @@
         <p:spPr>
           <a:xfrm>
             <a:off x="504000" y="301320"/>
-            <a:ext cx="9071280" cy="1262520"/>
+            <a:ext cx="9072000" cy="1262160"/>
           </a:xfrm>
           <a:prstGeom prst="rect">
             <a:avLst/>
@@ -1535,8 +1536,8 @@
         </p:nvSpPr>
         <p:spPr>
           <a:xfrm>
-            <a:off x="504000" y="1769040"/>
-            <a:ext cx="4426560" cy="2090520"/>
+            <a:off x="504000" y="1768680"/>
+            <a:ext cx="4426920" cy="2090880"/>
           </a:xfrm>
           <a:prstGeom prst="rect">
             <a:avLst/>
@@ -1561,8 +1562,8 @@
         </p:nvSpPr>
         <p:spPr>
           <a:xfrm>
-            <a:off x="5151960" y="1769040"/>
-            <a:ext cx="4426560" cy="2090520"/>
+            <a:off x="5152320" y="1768680"/>
+            <a:ext cx="4426920" cy="2090880"/>
           </a:xfrm>
           <a:prstGeom prst="rect">
             <a:avLst/>
@@ -1610,7 +1611,7 @@
         <p:spPr>
           <a:xfrm>
             <a:off x="504000" y="301320"/>
-            <a:ext cx="9071280" cy="1262520"/>
+            <a:ext cx="9072000" cy="1262160"/>
           </a:xfrm>
           <a:prstGeom prst="rect">
             <a:avLst/>
@@ -1636,8 +1637,8 @@
         </p:nvSpPr>
         <p:spPr>
           <a:xfrm>
-            <a:off x="504000" y="1769040"/>
-            <a:ext cx="9071280" cy="4383720"/>
+            <a:off x="504000" y="1768680"/>
+            <a:ext cx="9072000" cy="4384080"/>
           </a:xfrm>
           <a:prstGeom prst="rect">
             <a:avLst/>
@@ -1685,7 +1686,7 @@
         <p:spPr>
           <a:xfrm>
             <a:off x="504000" y="301320"/>
-            <a:ext cx="9071280" cy="1262520"/>
+            <a:ext cx="9072000" cy="1262160"/>
           </a:xfrm>
           <a:prstGeom prst="rect">
             <a:avLst/>
@@ -1711,8 +1712,8 @@
         </p:nvSpPr>
         <p:spPr>
           <a:xfrm>
-            <a:off x="504000" y="1769040"/>
-            <a:ext cx="4426560" cy="4383720"/>
+            <a:off x="504000" y="1768680"/>
+            <a:ext cx="4426920" cy="4384080"/>
           </a:xfrm>
           <a:prstGeom prst="rect">
             <a:avLst/>
@@ -1737,8 +1738,8 @@
         </p:nvSpPr>
         <p:spPr>
           <a:xfrm>
-            <a:off x="5151960" y="1769040"/>
-            <a:ext cx="4426560" cy="4383720"/>
+            <a:off x="5152320" y="1768680"/>
+            <a:ext cx="4426920" cy="4384080"/>
           </a:xfrm>
           <a:prstGeom prst="rect">
             <a:avLst/>
@@ -1786,7 +1787,7 @@
         <p:spPr>
           <a:xfrm>
             <a:off x="504000" y="301320"/>
-            <a:ext cx="9071280" cy="1262520"/>
+            <a:ext cx="9072000" cy="1262160"/>
           </a:xfrm>
           <a:prstGeom prst="rect">
             <a:avLst/>
@@ -1835,7 +1836,7 @@
         <p:spPr>
           <a:xfrm>
             <a:off x="504000" y="301320"/>
-            <a:ext cx="9071280" cy="5851440"/>
+            <a:ext cx="9072000" cy="5851440"/>
           </a:xfrm>
           <a:prstGeom prst="rect">
             <a:avLst/>
@@ -1884,7 +1885,7 @@
         <p:spPr>
           <a:xfrm>
             <a:off x="504000" y="301320"/>
-            <a:ext cx="9071280" cy="1262520"/>
+            <a:ext cx="9072000" cy="1262160"/>
           </a:xfrm>
           <a:prstGeom prst="rect">
             <a:avLst/>
@@ -1910,8 +1911,8 @@
         </p:nvSpPr>
         <p:spPr>
           <a:xfrm>
-            <a:off x="504000" y="1769040"/>
-            <a:ext cx="4426560" cy="2090520"/>
+            <a:off x="504000" y="1768680"/>
+            <a:ext cx="4426920" cy="2090880"/>
           </a:xfrm>
           <a:prstGeom prst="rect">
             <a:avLst/>
@@ -1937,7 +1938,7 @@
         <p:spPr>
           <a:xfrm>
             <a:off x="504000" y="4058280"/>
-            <a:ext cx="4426560" cy="2090520"/>
+            <a:ext cx="4426920" cy="2090880"/>
           </a:xfrm>
           <a:prstGeom prst="rect">
             <a:avLst/>
@@ -1962,8 +1963,8 @@
         </p:nvSpPr>
         <p:spPr>
           <a:xfrm>
-            <a:off x="5151960" y="1769040"/>
-            <a:ext cx="4426560" cy="4383720"/>
+            <a:off x="5152320" y="1768680"/>
+            <a:ext cx="4426920" cy="4384080"/>
           </a:xfrm>
           <a:prstGeom prst="rect">
             <a:avLst/>
@@ -2011,7 +2012,7 @@
         <p:spPr>
           <a:xfrm>
             <a:off x="504000" y="301320"/>
-            <a:ext cx="9071280" cy="1262520"/>
+            <a:ext cx="9072000" cy="1262160"/>
           </a:xfrm>
           <a:prstGeom prst="rect">
             <a:avLst/>
@@ -2037,8 +2038,8 @@
         </p:nvSpPr>
         <p:spPr>
           <a:xfrm>
-            <a:off x="504000" y="1769040"/>
-            <a:ext cx="4426560" cy="4383720"/>
+            <a:off x="504000" y="1768680"/>
+            <a:ext cx="4426920" cy="4384080"/>
           </a:xfrm>
           <a:prstGeom prst="rect">
             <a:avLst/>
@@ -2063,8 +2064,8 @@
         </p:nvSpPr>
         <p:spPr>
           <a:xfrm>
-            <a:off x="5151960" y="1769040"/>
-            <a:ext cx="4426560" cy="2090520"/>
+            <a:off x="5152320" y="1768680"/>
+            <a:ext cx="4426920" cy="2090880"/>
           </a:xfrm>
           <a:prstGeom prst="rect">
             <a:avLst/>
@@ -2089,8 +2090,8 @@
         </p:nvSpPr>
         <p:spPr>
           <a:xfrm>
-            <a:off x="5151960" y="4058280"/>
-            <a:ext cx="4426560" cy="2090520"/>
+            <a:off x="5152320" y="4058280"/>
+            <a:ext cx="4426920" cy="2090880"/>
           </a:xfrm>
           <a:prstGeom prst="rect">
             <a:avLst/>
@@ -2138,7 +2139,7 @@
         <p:spPr>
           <a:xfrm>
             <a:off x="504000" y="301320"/>
-            <a:ext cx="9071280" cy="1262520"/>
+            <a:ext cx="9072000" cy="1262160"/>
           </a:xfrm>
           <a:prstGeom prst="rect">
             <a:avLst/>
@@ -2164,8 +2165,8 @@
         </p:nvSpPr>
         <p:spPr>
           <a:xfrm>
-            <a:off x="504000" y="1769040"/>
-            <a:ext cx="4426560" cy="2090520"/>
+            <a:off x="504000" y="1768680"/>
+            <a:ext cx="4426920" cy="2090880"/>
           </a:xfrm>
           <a:prstGeom prst="rect">
             <a:avLst/>
@@ -2190,8 +2191,8 @@
         </p:nvSpPr>
         <p:spPr>
           <a:xfrm>
-            <a:off x="5151960" y="1769040"/>
-            <a:ext cx="4426560" cy="2090520"/>
+            <a:off x="5152320" y="1768680"/>
+            <a:ext cx="4426920" cy="2090880"/>
           </a:xfrm>
           <a:prstGeom prst="rect">
             <a:avLst/>
@@ -2217,7 +2218,7 @@
         <p:spPr>
           <a:xfrm>
             <a:off x="504000" y="4058280"/>
-            <a:ext cx="9070920" cy="2090520"/>
+            <a:ext cx="9071640" cy="2090880"/>
           </a:xfrm>
           <a:prstGeom prst="rect">
             <a:avLst/>
@@ -2265,7 +2266,7 @@
         <p:spPr>
           <a:xfrm>
             <a:off x="504000" y="301320"/>
-            <a:ext cx="9071280" cy="1262160"/>
+            <a:ext cx="9070920" cy="1262160"/>
           </a:xfrm>
           <a:prstGeom prst="rect">
             <a:avLst/>
@@ -2294,8 +2295,8 @@
         </p:nvSpPr>
         <p:spPr>
           <a:xfrm>
-            <a:off x="504000" y="1768680"/>
-            <a:ext cx="9072000" cy="4384080"/>
+            <a:off x="504000" y="1769040"/>
+            <a:ext cx="9070920" cy="4383360"/>
           </a:xfrm>
           <a:prstGeom prst="rect">
             <a:avLst/>
@@ -2439,7 +2440,7 @@
         <p:spPr>
           <a:xfrm>
             <a:off x="504000" y="301320"/>
-            <a:ext cx="9071280" cy="1262160"/>
+            <a:ext cx="9072000" cy="1261800"/>
           </a:xfrm>
           <a:prstGeom prst="rect">
             <a:avLst/>
@@ -2448,6 +2449,7 @@
         <p:txBody>
           <a:bodyPr anchor="ctr" bIns="0" lIns="0" rIns="0" tIns="0" wrap="none"/>
           <a:p>
+            <a:pPr algn="ctr"/>
             <a:r>
               <a:rPr lang="en-US"/>
               <a:t>Click to edit the title text format</a:t>
@@ -2468,8 +2470,8 @@
         </p:nvSpPr>
         <p:spPr>
           <a:xfrm>
-            <a:off x="504000" y="1769040"/>
-            <a:ext cx="9071280" cy="4383720"/>
+            <a:off x="504000" y="1768680"/>
+            <a:ext cx="9072000" cy="4384080"/>
           </a:xfrm>
           <a:prstGeom prst="rect">
             <a:avLst/>
@@ -2602,14 +2604,14 @@
       </p:grpSpPr>
       <p:sp>
         <p:nvSpPr>
-          <p:cNvPr id="68" name="CustomShape 1"/>
-          <p:cNvSpPr/>
+          <p:cNvPr id="68" name="TextShape 1"/>
+          <p:cNvSpPr txBox="1"/>
           <p:nvPr/>
         </p:nvSpPr>
         <p:spPr>
           <a:xfrm>
             <a:off x="504000" y="301320"/>
-            <a:ext cx="9071280" cy="1261800"/>
+            <a:ext cx="9070920" cy="1262160"/>
           </a:xfrm>
           <a:prstGeom prst="rect">
             <a:avLst/>
@@ -2618,14 +2620,10 @@
         <p:txBody>
           <a:bodyPr anchor="ctr" bIns="0" lIns="0" rIns="0" tIns="0" wrap="none"/>
           <a:p>
-            <a:pPr algn="ctr">
-              <a:lnSpc>
-                <a:spcPct val="100000"/>
-              </a:lnSpc>
-            </a:pPr>
+            <a:pPr algn="ctr"/>
             <a:r>
               <a:rPr lang="en-US"/>
-              <a:t>Shopping Module</a:t>
+              <a:t>Tracking change</a:t>
             </a:r>
             <a:endParaRPr/>
           </a:p>
@@ -2639,8 +2637,8 @@
         </p:nvSpPr>
         <p:spPr>
           <a:xfrm>
-            <a:off x="504000" y="1769040"/>
-            <a:ext cx="9071280" cy="4383720"/>
+            <a:off x="504360" y="1769040"/>
+            <a:ext cx="9070920" cy="4383360"/>
           </a:xfrm>
           <a:prstGeom prst="rect">
             <a:avLst/>
@@ -2648,41 +2646,6 @@
         </p:spPr>
         <p:txBody>
           <a:bodyPr anchor="ctr" bIns="0" lIns="0" rIns="0" tIns="0" wrap="none"/>
-          <a:p>
-            <a:r>
-              <a:rPr lang="en-US"/>
-              <a:t>- Mô tả </a:t>
-            </a:r>
-            <a:endParaRPr/>
-          </a:p>
-          <a:p>
-            <a:r>
-              <a:rPr lang="en-US"/>
-              <a:t>- Hiển thị sản phẩm.</a:t>
-            </a:r>
-            <a:endParaRPr/>
-          </a:p>
-          <a:p>
-            <a:r>
-              <a:rPr lang="en-US"/>
-              <a:t>- Rating sản phẩm.</a:t>
-            </a:r>
-            <a:endParaRPr/>
-          </a:p>
-          <a:p>
-            <a:r>
-              <a:rPr lang="en-US"/>
-              <a:t>- Quản lý thêm sản phẩm.</a:t>
-            </a:r>
-            <a:endParaRPr/>
-          </a:p>
-          <a:p>
-            <a:r>
-              <a:rPr lang="en-US"/>
-              <a:t>- Import sản phẩm từ file excel.</a:t>
-            </a:r>
-            <a:endParaRPr/>
-          </a:p>
           <a:p>
             <a:r>
               <a:rPr lang="en-US">
@@ -2690,14 +2653,19 @@
                   <a:srgbClr val="ff0000"/>
                 </a:solidFill>
               </a:rPr>
-              <a:t>- Thanh toán sản phẩm</a:t>
-            </a:r>
-            <a:endParaRPr/>
-          </a:p>
-          <a:p>
-            <a:endParaRPr/>
-          </a:p>
-          <a:p>
+              <a:t>- add mo tả thanh toán sản phẩm</a:t>
+            </a:r>
+            <a:endParaRPr/>
+          </a:p>
+          <a:p>
+            <a:r>
+              <a:rPr lang="en-US">
+                <a:solidFill>
+                  <a:srgbClr val="ff0000"/>
+                </a:solidFill>
+              </a:rPr>
+              <a:t>- modify import file excel  </a:t>
+            </a:r>
             <a:endParaRPr/>
           </a:p>
         </p:txBody>
@@ -2760,7 +2728,7 @@
         <p:spPr>
           <a:xfrm>
             <a:off x="504000" y="301320"/>
-            <a:ext cx="9071280" cy="1261800"/>
+            <a:ext cx="9070920" cy="1261440"/>
           </a:xfrm>
           <a:prstGeom prst="rect">
             <a:avLst/>
@@ -2776,7 +2744,7 @@
             </a:pPr>
             <a:r>
               <a:rPr lang="en-US"/>
-              <a:t>Mô tả</a:t>
+              <a:t>Shopping Module</a:t>
             </a:r>
             <a:endParaRPr/>
           </a:p>
@@ -2790,36 +2758,65 @@
         </p:nvSpPr>
         <p:spPr>
           <a:xfrm>
-            <a:off x="457200" y="1833840"/>
-            <a:ext cx="9071280" cy="4383720"/>
-          </a:xfrm>
-          <a:prstGeom prst="rect">
-            <a:avLst/>
-          </a:prstGeom>
-        </p:spPr>
-        <p:txBody>
-          <a:bodyPr bIns="0" lIns="0" rIns="0" tIns="0" wrap="none"/>
-          <a:p>
-            <a:pPr>
-              <a:lnSpc>
-                <a:spcPct val="100000"/>
-              </a:lnSpc>
-              <a:buSzPct val="25000"/>
-              <a:buFont typeface="StarSymbol"/>
-              <a:buChar char="l"/>
-            </a:pPr>
+            <a:off x="504000" y="1769040"/>
+            <a:ext cx="9070920" cy="4383360"/>
+          </a:xfrm>
+          <a:prstGeom prst="rect">
+            <a:avLst/>
+          </a:prstGeom>
+        </p:spPr>
+        <p:txBody>
+          <a:bodyPr anchor="ctr" bIns="0" lIns="0" rIns="0" tIns="0" wrap="none"/>
+          <a:p>
             <a:r>
               <a:rPr lang="en-US"/>
-              <a:t>Đây là chức năng chính của hệ thống.</a:t>
-            </a:r>
-            <a:endParaRPr/>
-          </a:p>
-          <a:p>
-            <a:pPr>
-              <a:lnSpc>
-                <a:spcPct val="100000"/>
-              </a:lnSpc>
-            </a:pPr>
+              <a:t>- Mô tả </a:t>
+            </a:r>
+            <a:endParaRPr/>
+          </a:p>
+          <a:p>
+            <a:r>
+              <a:rPr lang="en-US"/>
+              <a:t>- Hiển thị sản phẩm.</a:t>
+            </a:r>
+            <a:endParaRPr/>
+          </a:p>
+          <a:p>
+            <a:r>
+              <a:rPr lang="en-US"/>
+              <a:t>- Rating sản phẩm.</a:t>
+            </a:r>
+            <a:endParaRPr/>
+          </a:p>
+          <a:p>
+            <a:r>
+              <a:rPr lang="en-US"/>
+              <a:t>- Quản lý thêm sản phẩm.</a:t>
+            </a:r>
+            <a:endParaRPr/>
+          </a:p>
+          <a:p>
+            <a:r>
+              <a:rPr lang="en-US"/>
+              <a:t>- Import sản phẩm từ file excel.</a:t>
+            </a:r>
+            <a:endParaRPr/>
+          </a:p>
+          <a:p>
+            <a:r>
+              <a:rPr lang="en-US">
+                <a:solidFill>
+                  <a:srgbClr val="ff0000"/>
+                </a:solidFill>
+              </a:rPr>
+              <a:t>- Thanh toán sản phẩm</a:t>
+            </a:r>
+            <a:endParaRPr/>
+          </a:p>
+          <a:p>
+            <a:endParaRPr/>
+          </a:p>
+          <a:p>
             <a:endParaRPr/>
           </a:p>
         </p:txBody>
@@ -2882,7 +2879,7 @@
         <p:spPr>
           <a:xfrm>
             <a:off x="504000" y="301320"/>
-            <a:ext cx="9071280" cy="1261800"/>
+            <a:ext cx="9070920" cy="1261440"/>
           </a:xfrm>
           <a:prstGeom prst="rect">
             <a:avLst/>
@@ -2898,7 +2895,7 @@
             </a:pPr>
             <a:r>
               <a:rPr lang="en-US"/>
-              <a:t>Hiển thị sản phẩm</a:t>
+              <a:t>Mô tả</a:t>
             </a:r>
             <a:endParaRPr/>
           </a:p>
@@ -2912,8 +2909,8 @@
         </p:nvSpPr>
         <p:spPr>
           <a:xfrm>
-            <a:off x="504000" y="1769040"/>
-            <a:ext cx="9071280" cy="4383720"/>
+            <a:off x="457200" y="1833840"/>
+            <a:ext cx="9070920" cy="4383360"/>
           </a:xfrm>
           <a:prstGeom prst="rect">
             <a:avLst/>
@@ -2932,22 +2929,7 @@
             </a:pPr>
             <a:r>
               <a:rPr lang="en-US"/>
-              <a:t>Mặt hàng có nhiều loại, hiển thị phân trang tất cả các sản phẩm</a:t>
-            </a:r>
-            <a:endParaRPr/>
-          </a:p>
-          <a:p>
-            <a:pPr>
-              <a:lnSpc>
-                <a:spcPct val="100000"/>
-              </a:lnSpc>
-              <a:buSzPct val="25000"/>
-              <a:buFont typeface="StarSymbol"/>
-              <a:buChar char="l"/>
-            </a:pPr>
-            <a:r>
-              <a:rPr lang="en-US"/>
-              <a:t>Có thể sort sản phẩm theo : price, ngày update,  rating.</a:t>
+              <a:t>Đây là chức năng chính của hệ thống.</a:t>
             </a:r>
             <a:endParaRPr/>
           </a:p>
@@ -3019,7 +3001,7 @@
         <p:spPr>
           <a:xfrm>
             <a:off x="504000" y="301320"/>
-            <a:ext cx="9071280" cy="1261800"/>
+            <a:ext cx="9070920" cy="1261440"/>
           </a:xfrm>
           <a:prstGeom prst="rect">
             <a:avLst/>
@@ -3035,7 +3017,7 @@
             </a:pPr>
             <a:r>
               <a:rPr lang="en-US"/>
-              <a:t>Rating sản phẩm</a:t>
+              <a:t>Hiển thị sản phẩm</a:t>
             </a:r>
             <a:endParaRPr/>
           </a:p>
@@ -3050,7 +3032,7 @@
         <p:spPr>
           <a:xfrm>
             <a:off x="504000" y="1769040"/>
-            <a:ext cx="9071280" cy="4383720"/>
+            <a:ext cx="9070920" cy="4383360"/>
           </a:xfrm>
           <a:prstGeom prst="rect">
             <a:avLst/>
@@ -3069,7 +3051,7 @@
             </a:pPr>
             <a:r>
               <a:rPr lang="en-US"/>
-              <a:t>Cho người dùng like or dislike sản phẩm</a:t>
+              <a:t>Mặt hàng có nhiều loại, hiển thị phân trang tất cả các sản phẩm</a:t>
             </a:r>
             <a:endParaRPr/>
           </a:p>
@@ -3084,7 +3066,7 @@
             </a:pPr>
             <a:r>
               <a:rPr lang="en-US"/>
-              <a:t>like thì +1 cho số lượng like.</a:t>
+              <a:t>Có thể sort sản phẩm theo : price, ngày update,  rating.</a:t>
             </a:r>
             <a:endParaRPr/>
           </a:p>
@@ -3093,29 +3075,7 @@
               <a:lnSpc>
                 <a:spcPct val="100000"/>
               </a:lnSpc>
-              <a:buSzPct val="25000"/>
-              <a:buFont typeface="StarSymbol"/>
-              <a:buChar char="l"/>
             </a:pPr>
-            <a:r>
-              <a:rPr lang="en-US"/>
-              <a:t>dislike thì +1 cho số lượng displike</a:t>
-            </a:r>
-            <a:endParaRPr/>
-          </a:p>
-          <a:p>
-            <a:pPr>
-              <a:lnSpc>
-                <a:spcPct val="100000"/>
-              </a:lnSpc>
-              <a:buSzPct val="25000"/>
-              <a:buFont typeface="StarSymbol"/>
-              <a:buChar char="l"/>
-            </a:pPr>
-            <a:r>
-              <a:rPr lang="en-US"/>
-              <a:t>Calculate popular =  num like - num dislike</a:t>
-            </a:r>
             <a:endParaRPr/>
           </a:p>
         </p:txBody>
@@ -3178,7 +3138,7 @@
         <p:spPr>
           <a:xfrm>
             <a:off x="504000" y="301320"/>
-            <a:ext cx="9071280" cy="1261800"/>
+            <a:ext cx="9070920" cy="1261440"/>
           </a:xfrm>
           <a:prstGeom prst="rect">
             <a:avLst/>
@@ -3194,7 +3154,7 @@
             </a:pPr>
             <a:r>
               <a:rPr lang="en-US"/>
-              <a:t>Quản lý thêm sản phẩm</a:t>
+              <a:t>Rating sản phẩm</a:t>
             </a:r>
             <a:endParaRPr/>
           </a:p>
@@ -3209,7 +3169,7 @@
         <p:spPr>
           <a:xfrm>
             <a:off x="504000" y="1769040"/>
-            <a:ext cx="9071280" cy="4383720"/>
+            <a:ext cx="9070920" cy="4383360"/>
           </a:xfrm>
           <a:prstGeom prst="rect">
             <a:avLst/>
@@ -3228,82 +3188,10 @@
             </a:pPr>
             <a:r>
               <a:rPr lang="en-US"/>
-              <a:t>Để thêm sản phẩm vào hệ thống.</a:t>
-            </a:r>
-            <a:endParaRPr/>
-          </a:p>
-        </p:txBody>
-      </p:sp>
-    </p:spTree>
-  </p:cSld>
-</p:sld>
-</file>
-
-<file path=ppt/slides/slide6.xml><?xml version="1.0" encoding="utf-8"?>
-<p:sld xmlns:a="http://schemas.openxmlformats.org/drawingml/2006/main" xmlns:p="http://schemas.openxmlformats.org/presentationml/2006/main" xmlns:r="http://schemas.openxmlformats.org/officeDocument/2006/relationships">
-  <p:cSld>
-    <p:spTree>
-      <p:nvGrpSpPr>
-        <p:cNvPr id="1" name=""/>
-        <p:cNvGrpSpPr/>
-        <p:nvPr/>
-      </p:nvGrpSpPr>
-      <p:grpSpPr>
-        <a:xfrm>
-          <a:off x="0" y="0"/>
-          <a:ext cx="0" cy="0"/>
-          <a:chOff x="0" y="0"/>
-          <a:chExt cx="0" cy="0"/>
-        </a:xfrm>
-      </p:grpSpPr>
-      <p:sp>
-        <p:nvSpPr>
-          <p:cNvPr id="78" name="CustomShape 1"/>
-          <p:cNvSpPr/>
-          <p:nvPr/>
-        </p:nvSpPr>
-        <p:spPr>
-          <a:xfrm>
-            <a:off x="504000" y="301320"/>
-            <a:ext cx="9071280" cy="1261800"/>
-          </a:xfrm>
-          <a:prstGeom prst="rect">
-            <a:avLst/>
-          </a:prstGeom>
-        </p:spPr>
-        <p:txBody>
-          <a:bodyPr anchor="ctr" bIns="0" lIns="0" rIns="0" tIns="0" wrap="none"/>
-          <a:p>
-            <a:pPr algn="ctr">
-              <a:lnSpc>
-                <a:spcPct val="100000"/>
-              </a:lnSpc>
-            </a:pPr>
-            <a:r>
-              <a:rPr lang="en-US"/>
-              <a:t>Import sản phẩm từ file excel.</a:t>
-            </a:r>
-            <a:endParaRPr/>
-          </a:p>
-        </p:txBody>
-      </p:sp>
-      <p:sp>
-        <p:nvSpPr>
-          <p:cNvPr id="79" name="CustomShape 2"/>
-          <p:cNvSpPr/>
-          <p:nvPr/>
-        </p:nvSpPr>
-        <p:spPr>
-          <a:xfrm>
-            <a:off x="504000" y="1769040"/>
-            <a:ext cx="9071280" cy="4383720"/>
-          </a:xfrm>
-          <a:prstGeom prst="rect">
-            <a:avLst/>
-          </a:prstGeom>
-        </p:spPr>
-        <p:txBody>
-          <a:bodyPr bIns="0" lIns="0" rIns="0" tIns="0" wrap="none"/>
+              <a:t>Cho người dùng like or dislike sản phẩm</a:t>
+            </a:r>
+            <a:endParaRPr/>
+          </a:p>
           <a:p>
             <a:pPr>
               <a:lnSpc>
@@ -3315,7 +3203,7 @@
             </a:pPr>
             <a:r>
               <a:rPr lang="en-US"/>
-              <a:t>Thay cho việc nhập tay một sản phẩm quá lâu.</a:t>
+              <a:t>like thì +1 cho số lượng like.</a:t>
             </a:r>
             <a:endParaRPr/>
           </a:p>
@@ -3330,7 +3218,7 @@
             </a:pPr>
             <a:r>
               <a:rPr lang="en-US"/>
-              <a:t>Chức năng này có thể giúp tạo data giả.</a:t>
+              <a:t>dislike thì +1 cho số lượng displike</a:t>
             </a:r>
             <a:endParaRPr/>
           </a:p>
@@ -3345,7 +3233,7 @@
             </a:pPr>
             <a:r>
               <a:rPr lang="en-US"/>
-              <a:t>Tạo một template file excel mẫu. một giao diện web. upload file. kết quả là phải có data.</a:t>
+              <a:t>Calculate popular =  num like - num dislike</a:t>
             </a:r>
             <a:endParaRPr/>
           </a:p>
@@ -3383,6 +3271,93 @@
 </p:sld>
 </file>
 
+<file path=ppt/slides/slide6.xml><?xml version="1.0" encoding="utf-8"?>
+<p:sld xmlns:a="http://schemas.openxmlformats.org/drawingml/2006/main" xmlns:p="http://schemas.openxmlformats.org/presentationml/2006/main" xmlns:r="http://schemas.openxmlformats.org/officeDocument/2006/relationships">
+  <p:cSld>
+    <p:spTree>
+      <p:nvGrpSpPr>
+        <p:cNvPr id="1" name=""/>
+        <p:cNvGrpSpPr/>
+        <p:nvPr/>
+      </p:nvGrpSpPr>
+      <p:grpSpPr>
+        <a:xfrm>
+          <a:off x="0" y="0"/>
+          <a:ext cx="0" cy="0"/>
+          <a:chOff x="0" y="0"/>
+          <a:chExt cx="0" cy="0"/>
+        </a:xfrm>
+      </p:grpSpPr>
+      <p:sp>
+        <p:nvSpPr>
+          <p:cNvPr id="78" name="CustomShape 1"/>
+          <p:cNvSpPr/>
+          <p:nvPr/>
+        </p:nvSpPr>
+        <p:spPr>
+          <a:xfrm>
+            <a:off x="504000" y="301320"/>
+            <a:ext cx="9070920" cy="1261440"/>
+          </a:xfrm>
+          <a:prstGeom prst="rect">
+            <a:avLst/>
+          </a:prstGeom>
+        </p:spPr>
+        <p:txBody>
+          <a:bodyPr anchor="ctr" bIns="0" lIns="0" rIns="0" tIns="0" wrap="none"/>
+          <a:p>
+            <a:pPr algn="ctr">
+              <a:lnSpc>
+                <a:spcPct val="100000"/>
+              </a:lnSpc>
+            </a:pPr>
+            <a:r>
+              <a:rPr lang="en-US"/>
+              <a:t>Quản lý thêm sản phẩm</a:t>
+            </a:r>
+            <a:endParaRPr/>
+          </a:p>
+        </p:txBody>
+      </p:sp>
+      <p:sp>
+        <p:nvSpPr>
+          <p:cNvPr id="79" name="CustomShape 2"/>
+          <p:cNvSpPr/>
+          <p:nvPr/>
+        </p:nvSpPr>
+        <p:spPr>
+          <a:xfrm>
+            <a:off x="504000" y="1769040"/>
+            <a:ext cx="9070920" cy="4383360"/>
+          </a:xfrm>
+          <a:prstGeom prst="rect">
+            <a:avLst/>
+          </a:prstGeom>
+        </p:spPr>
+        <p:txBody>
+          <a:bodyPr bIns="0" lIns="0" rIns="0" tIns="0" wrap="none"/>
+          <a:p>
+            <a:pPr>
+              <a:lnSpc>
+                <a:spcPct val="100000"/>
+              </a:lnSpc>
+              <a:buSzPct val="25000"/>
+              <a:buFont typeface="StarSymbol"/>
+              <a:buChar char="l"/>
+            </a:pPr>
+            <a:r>
+              <a:rPr lang="en-US"/>
+              <a:t>Để thêm sản phẩm vào hệ thống.</a:t>
+            </a:r>
+            <a:endParaRPr/>
+          </a:p>
+        </p:txBody>
+      </p:sp>
+    </p:spTree>
+  </p:cSld>
+</p:sld>
+</file>
+
 <file path=ppt/slides/slide7.xml><?xml version="1.0" encoding="utf-8"?>
 <p:sld xmlns:a="http://schemas.openxmlformats.org/drawingml/2006/main" xmlns:p="http://schemas.openxmlformats.org/presentationml/2006/main" xmlns:r="http://schemas.openxmlformats.org/officeDocument/2006/relationships">
   <p:cSld>
@@ -3402,14 +3377,14 @@
       </p:grpSpPr>
       <p:sp>
         <p:nvSpPr>
-          <p:cNvPr id="80" name="TextShape 1"/>
-          <p:cNvSpPr txBox="1"/>
+          <p:cNvPr id="80" name="CustomShape 1"/>
+          <p:cNvSpPr/>
           <p:nvPr/>
         </p:nvSpPr>
         <p:spPr>
           <a:xfrm>
             <a:off x="504000" y="301320"/>
-            <a:ext cx="9071280" cy="1262160"/>
+            <a:ext cx="9070920" cy="1261440"/>
           </a:xfrm>
           <a:prstGeom prst="rect">
             <a:avLst/>
@@ -3418,14 +3393,14 @@
         <p:txBody>
           <a:bodyPr anchor="ctr" bIns="0" lIns="0" rIns="0" tIns="0" wrap="none"/>
           <a:p>
-            <a:pPr algn="ctr"/>
-            <a:r>
-              <a:rPr lang="en-US">
-                <a:solidFill>
-                  <a:srgbClr val="ff0000"/>
-                </a:solidFill>
-              </a:rPr>
-              <a:t>Thanh toán sản phẩm</a:t>
+            <a:pPr algn="ctr">
+              <a:lnSpc>
+                <a:spcPct val="100000"/>
+              </a:lnSpc>
+            </a:pPr>
+            <a:r>
+              <a:rPr lang="en-US"/>
+              <a:t>Import sản phẩm từ file excel.</a:t>
             </a:r>
             <a:endParaRPr/>
           </a:p>
@@ -3439,8 +3414,8 @@
         </p:nvSpPr>
         <p:spPr>
           <a:xfrm>
-            <a:off x="504000" y="1769400"/>
-            <a:ext cx="9071280" cy="4383720"/>
+            <a:off x="504000" y="1769040"/>
+            <a:ext cx="9070920" cy="4383360"/>
           </a:xfrm>
           <a:prstGeom prst="rect">
             <a:avLst/>
@@ -3458,12 +3433,8 @@
               <a:buChar char="l"/>
             </a:pPr>
             <a:r>
-              <a:rPr lang="en-US">
-                <a:solidFill>
-                  <a:srgbClr val="ff0000"/>
-                </a:solidFill>
-              </a:rPr>
-              <a:t>Module để cho người dùng thanh toán sản phẩm đã chọn.</a:t>
+              <a:rPr lang="en-US"/>
+              <a:t>Thay cho việc nhập tay một sản phẩm quá lâu.</a:t>
             </a:r>
             <a:endParaRPr/>
           </a:p>
@@ -3476,6 +3447,10 @@
               <a:buFont typeface="StarSymbol"/>
               <a:buChar char="l"/>
             </a:pPr>
+            <a:r>
+              <a:rPr lang="en-US"/>
+              <a:t>Chức năng này có thể giúp tạo data giả.</a:t>
+            </a:r>
             <a:endParaRPr/>
           </a:p>
           <a:p>
@@ -3488,12 +3463,8 @@
               <a:buChar char="l"/>
             </a:pPr>
             <a:r>
-              <a:rPr lang="en-US">
-                <a:solidFill>
-                  <a:srgbClr val="ff0000"/>
-                </a:solidFill>
-              </a:rPr>
-              <a:t>- dùng internet banking, thanh toán để giữ hàng.</a:t>
+              <a:rPr lang="en-US"/>
+              <a:t>Tạo một template file excel mẫu. một giao diện web. upload file. kết quả là phải có data.</a:t>
             </a:r>
             <a:endParaRPr/>
           </a:p>
@@ -3507,31 +3478,8 @@
               <a:buChar char="l"/>
             </a:pPr>
             <a:r>
-              <a:rPr lang="en-US">
-                <a:solidFill>
-                  <a:srgbClr val="ff0000"/>
-                </a:solidFill>
-              </a:rPr>
-              <a:t>- hoặc dùng số điện thoại và cmnd để khách hàng giữ món hàng dó. </a:t>
-            </a:r>
-            <a:endParaRPr/>
-          </a:p>
-          <a:p>
-            <a:pPr>
-              <a:lnSpc>
-                <a:spcPct val="100000"/>
-              </a:lnSpc>
-              <a:buSzPct val="25000"/>
-              <a:buFont typeface="StarSymbol"/>
-              <a:buChar char="l"/>
-            </a:pPr>
-            <a:r>
-              <a:rPr lang="en-US">
-                <a:solidFill>
-                  <a:srgbClr val="ff0000"/>
-                </a:solidFill>
-              </a:rPr>
-              <a:t>và tới tận quầy để mua.</a:t>
+              <a:rPr lang="en-US"/>
+              <a:t>Dùng thư viện jcsv . google code. Export import csv file.</a:t>
             </a:r>
             <a:endParaRPr/>
           </a:p>
@@ -3546,6 +3494,193 @@
           <p:childTnLst>
             <p:seq>
               <p:cTn id="12" nodeType="mainSeq"/>
+              <p:prevCondLst>
+                <p:cond delay="0" evt="onPrev">
+                  <p:tgtEl>
+                    <p:sldTgt/>
+                  </p:tgtEl>
+                </p:cond>
+              </p:prevCondLst>
+              <p:nextCondLst>
+                <p:cond delay="0" evt="onNext">
+                  <p:tgtEl>
+                    <p:sldTgt/>
+                  </p:tgtEl>
+                </p:cond>
+              </p:nextCondLst>
+            </p:seq>
+          </p:childTnLst>
+        </p:cTn>
+      </p:par>
+    </p:tnLst>
+  </p:timing>
+</p:sld>
+</file>
+
+<file path=ppt/slides/slide8.xml><?xml version="1.0" encoding="utf-8"?>
+<p:sld xmlns:a="http://schemas.openxmlformats.org/drawingml/2006/main" xmlns:p="http://schemas.openxmlformats.org/presentationml/2006/main" xmlns:r="http://schemas.openxmlformats.org/officeDocument/2006/relationships">
+  <p:cSld>
+    <p:spTree>
+      <p:nvGrpSpPr>
+        <p:cNvPr id="1" name=""/>
+        <p:cNvGrpSpPr/>
+        <p:nvPr/>
+      </p:nvGrpSpPr>
+      <p:grpSpPr>
+        <a:xfrm>
+          <a:off x="0" y="0"/>
+          <a:ext cx="0" cy="0"/>
+          <a:chOff x="0" y="0"/>
+          <a:chExt cx="0" cy="0"/>
+        </a:xfrm>
+      </p:grpSpPr>
+      <p:sp>
+        <p:nvSpPr>
+          <p:cNvPr id="82" name="CustomShape 1"/>
+          <p:cNvSpPr/>
+          <p:nvPr/>
+        </p:nvSpPr>
+        <p:spPr>
+          <a:xfrm>
+            <a:off x="504000" y="301320"/>
+            <a:ext cx="9070920" cy="1261800"/>
+          </a:xfrm>
+          <a:prstGeom prst="rect">
+            <a:avLst/>
+          </a:prstGeom>
+        </p:spPr>
+        <p:txBody>
+          <a:bodyPr anchor="ctr" bIns="0" lIns="0" rIns="0" tIns="0" wrap="none"/>
+          <a:p>
+            <a:pPr algn="ctr">
+              <a:lnSpc>
+                <a:spcPct val="100000"/>
+              </a:lnSpc>
+            </a:pPr>
+            <a:r>
+              <a:rPr lang="en-US">
+                <a:solidFill>
+                  <a:srgbClr val="ff0000"/>
+                </a:solidFill>
+              </a:rPr>
+              <a:t>Thanh toán sản phẩm</a:t>
+            </a:r>
+            <a:endParaRPr/>
+          </a:p>
+        </p:txBody>
+      </p:sp>
+      <p:sp>
+        <p:nvSpPr>
+          <p:cNvPr id="83" name="CustomShape 2"/>
+          <p:cNvSpPr/>
+          <p:nvPr/>
+        </p:nvSpPr>
+        <p:spPr>
+          <a:xfrm>
+            <a:off x="504000" y="1769400"/>
+            <a:ext cx="9070920" cy="4383360"/>
+          </a:xfrm>
+          <a:prstGeom prst="rect">
+            <a:avLst/>
+          </a:prstGeom>
+        </p:spPr>
+        <p:txBody>
+          <a:bodyPr bIns="0" lIns="0" rIns="0" tIns="0" wrap="none"/>
+          <a:p>
+            <a:pPr>
+              <a:lnSpc>
+                <a:spcPct val="100000"/>
+              </a:lnSpc>
+              <a:buSzPct val="25000"/>
+              <a:buFont typeface="StarSymbol"/>
+              <a:buChar char="l"/>
+            </a:pPr>
+            <a:r>
+              <a:rPr lang="en-US">
+                <a:solidFill>
+                  <a:srgbClr val="ff0000"/>
+                </a:solidFill>
+              </a:rPr>
+              <a:t>Module để cho người dùng thanh toán sản phẩm đã chọn.</a:t>
+            </a:r>
+            <a:endParaRPr/>
+          </a:p>
+          <a:p>
+            <a:pPr>
+              <a:lnSpc>
+                <a:spcPct val="100000"/>
+              </a:lnSpc>
+            </a:pPr>
+            <a:endParaRPr/>
+          </a:p>
+          <a:p>
+            <a:pPr>
+              <a:lnSpc>
+                <a:spcPct val="100000"/>
+              </a:lnSpc>
+              <a:buSzPct val="25000"/>
+              <a:buFont typeface="StarSymbol"/>
+              <a:buChar char="l"/>
+            </a:pPr>
+            <a:r>
+              <a:rPr lang="en-US">
+                <a:solidFill>
+                  <a:srgbClr val="ff0000"/>
+                </a:solidFill>
+              </a:rPr>
+              <a:t>- dùng internet banking, thanh toán để giữ hàng.</a:t>
+            </a:r>
+            <a:endParaRPr/>
+          </a:p>
+          <a:p>
+            <a:pPr>
+              <a:lnSpc>
+                <a:spcPct val="100000"/>
+              </a:lnSpc>
+              <a:buSzPct val="25000"/>
+              <a:buFont typeface="StarSymbol"/>
+              <a:buChar char="l"/>
+            </a:pPr>
+            <a:r>
+              <a:rPr lang="en-US">
+                <a:solidFill>
+                  <a:srgbClr val="ff0000"/>
+                </a:solidFill>
+              </a:rPr>
+              <a:t>- hoặc dùng số điện thoại và cmnd để khách hàng giữ món hàng dó. </a:t>
+            </a:r>
+            <a:endParaRPr/>
+          </a:p>
+          <a:p>
+            <a:pPr>
+              <a:lnSpc>
+                <a:spcPct val="100000"/>
+              </a:lnSpc>
+              <a:buSzPct val="25000"/>
+              <a:buFont typeface="StarSymbol"/>
+              <a:buChar char="l"/>
+            </a:pPr>
+            <a:r>
+              <a:rPr lang="en-US">
+                <a:solidFill>
+                  <a:srgbClr val="ff0000"/>
+                </a:solidFill>
+              </a:rPr>
+              <a:t>và tới tận quầy để mua.</a:t>
+            </a:r>
+            <a:endParaRPr/>
+          </a:p>
+        </p:txBody>
+      </p:sp>
+    </p:spTree>
+  </p:cSld>
+  <p:timing>
+    <p:tnLst>
+      <p:par>
+        <p:cTn dur="indefinite" id="13" nodeType="tmRoot" restart="never">
+          <p:childTnLst>
+            <p:seq>
+              <p:cTn id="14" nodeType="mainSeq"/>
               <p:prevCondLst>
                 <p:cond delay="0" evt="onPrev">
                   <p:tgtEl>

</xml_diff>